<commit_message>
add security tools and security hub screenshot
</commit_message>
<xml_diff>
--- a/DevSecOpsPipeline.pptx
+++ b/DevSecOpsPipeline.pptx
@@ -5836,7 +5836,7 @@
         <p:spPr>
           <a:xfrm>
             <a:off x="1606375" y="2971100"/>
-            <a:ext cx="834988" cy="536901"/>
+            <a:ext cx="653999" cy="536901"/>
           </a:xfrm>
           <a:prstGeom prst="bentConnector3">
             <a:avLst>
@@ -5967,6 +5967,21 @@
               <a:t>Static code analysis</a:t>
             </a:r>
           </a:p>
+          <a:p>
+            <a:pPr marL="0" lvl="0" indent="0" algn="ctr" rtl="0">
+              <a:spcBef>
+                <a:spcPts val="0"/>
+              </a:spcBef>
+              <a:spcAft>
+                <a:spcPts val="0"/>
+              </a:spcAft>
+              <a:buNone/>
+            </a:pPr>
+            <a:r>
+              <a:rPr lang="en" sz="1000" dirty="0"/>
+              <a:t>[SonarQube]</a:t>
+            </a:r>
+          </a:p>
         </p:txBody>
       </p:sp>
       <p:sp>
@@ -6016,6 +6031,37 @@
             <a:r>
               <a:rPr lang="en" sz="1000" dirty="0"/>
               <a:t>Library Vulnerability Scanning</a:t>
+            </a:r>
+          </a:p>
+          <a:p>
+            <a:pPr marL="0" lvl="0" indent="0" algn="ctr" rtl="0">
+              <a:spcBef>
+                <a:spcPts val="0"/>
+              </a:spcBef>
+              <a:spcAft>
+                <a:spcPts val="0"/>
+              </a:spcAft>
+              <a:buNone/>
+            </a:pPr>
+            <a:r>
+              <a:rPr lang="en" sz="1000" dirty="0"/>
+              <a:t>[J</a:t>
+            </a:r>
+            <a:r>
+              <a:rPr lang="en-GB" sz="1000" dirty="0"/>
+              <a:t>f</a:t>
+            </a:r>
+            <a:r>
+              <a:rPr lang="en" sz="1000" dirty="0"/>
+              <a:t>rog </a:t>
+            </a:r>
+            <a:r>
+              <a:rPr lang="en" sz="1000" dirty="0" err="1"/>
+              <a:t>XRay</a:t>
+            </a:r>
+            <a:r>
+              <a:rPr lang="en" sz="1000" dirty="0"/>
+              <a:t>]</a:t>
             </a:r>
           </a:p>
         </p:txBody>
@@ -6145,6 +6191,29 @@
               <a:t>Container Vulnerability Scanning</a:t>
             </a:r>
           </a:p>
+          <a:p>
+            <a:pPr marL="0" lvl="0" indent="0" algn="ctr" rtl="0">
+              <a:spcBef>
+                <a:spcPts val="0"/>
+              </a:spcBef>
+              <a:spcAft>
+                <a:spcPts val="0"/>
+              </a:spcAft>
+              <a:buNone/>
+            </a:pPr>
+            <a:r>
+              <a:rPr lang="en" sz="1000" dirty="0"/>
+              <a:t>[Clair by </a:t>
+            </a:r>
+            <a:r>
+              <a:rPr lang="en" sz="1000" dirty="0" err="1"/>
+              <a:t>CoreOs</a:t>
+            </a:r>
+            <a:r>
+              <a:rPr lang="en" sz="1000" dirty="0"/>
+              <a:t>]</a:t>
+            </a:r>
+          </a:p>
         </p:txBody>
       </p:sp>
       <p:cxnSp>
@@ -6199,8 +6268,8 @@
         </p:nvSpPr>
         <p:spPr>
           <a:xfrm>
-            <a:off x="2441363" y="3209201"/>
-            <a:ext cx="1308000" cy="597600"/>
+            <a:off x="2260374" y="3209201"/>
+            <a:ext cx="1616681" cy="597600"/>
           </a:xfrm>
           <a:prstGeom prst="rect">
             <a:avLst/>
@@ -6240,6 +6309,29 @@
             <a:r>
               <a:rPr lang="en" sz="1000" dirty="0"/>
               <a:t> Scanning</a:t>
+            </a:r>
+          </a:p>
+          <a:p>
+            <a:pPr marL="0" lvl="0" indent="0" algn="ctr" rtl="0">
+              <a:spcBef>
+                <a:spcPts val="0"/>
+              </a:spcBef>
+              <a:spcAft>
+                <a:spcPts val="0"/>
+              </a:spcAft>
+              <a:buNone/>
+            </a:pPr>
+            <a:r>
+              <a:rPr lang="en" sz="1000" dirty="0"/>
+              <a:t>[</a:t>
+            </a:r>
+            <a:r>
+              <a:rPr lang="en" sz="1000" dirty="0" err="1"/>
+              <a:t>Terrascan</a:t>
+            </a:r>
+            <a:r>
+              <a:rPr lang="en" sz="1000" dirty="0"/>
+              <a:t>]</a:t>
             </a:r>
           </a:p>
         </p:txBody>
@@ -6376,8 +6468,8 @@
         </p:nvCxnSpPr>
         <p:spPr>
           <a:xfrm rot="5400000" flipH="1">
-            <a:off x="1755418" y="2466857"/>
-            <a:ext cx="536901" cy="2142988"/>
+            <a:off x="1742094" y="2480181"/>
+            <a:ext cx="536901" cy="2116340"/>
           </a:xfrm>
           <a:prstGeom prst="bentConnector3">
             <a:avLst>
@@ -6414,8 +6506,8 @@
         </p:nvCxnSpPr>
         <p:spPr>
           <a:xfrm flipV="1">
-            <a:off x="3749363" y="2709025"/>
-            <a:ext cx="1527900" cy="798976"/>
+            <a:off x="3877055" y="2709025"/>
+            <a:ext cx="1400208" cy="798976"/>
           </a:xfrm>
           <a:prstGeom prst="bentConnector2">
             <a:avLst/>
@@ -6487,6 +6579,21 @@
             <a:r>
               <a:rPr lang="en" sz="1000" dirty="0"/>
               <a:t> Scanning</a:t>
+            </a:r>
+          </a:p>
+          <a:p>
+            <a:pPr marL="0" lvl="0" indent="0" algn="ctr" rtl="0">
+              <a:spcBef>
+                <a:spcPts val="0"/>
+              </a:spcBef>
+              <a:spcAft>
+                <a:spcPts val="0"/>
+              </a:spcAft>
+              <a:buNone/>
+            </a:pPr>
+            <a:r>
+              <a:rPr lang="en" sz="1000" dirty="0"/>
+              <a:t>[Amazon Inspector]</a:t>
             </a:r>
           </a:p>
         </p:txBody>

</xml_diff>